<commit_message>
updated ppt for rspec
</commit_message>
<xml_diff>
--- a/ruby-rails-testing_with_Rspec.pptx
+++ b/ruby-rails-testing_with_Rspec.pptx
@@ -6249,21 +6249,10 @@
               <a:t> using </a:t>
             </a:r>
             <a:r>
-              <a:rPr lang="en-US" dirty="0" err="1"/>
+              <a:rPr lang="en-US" dirty="0" err="1" smtClean="0"/>
               <a:t>RSpec</a:t>
             </a:r>
-            <a:r>
-              <a:rPr lang="en-US" dirty="0"/>
-              <a:t> and mocking libraries like </a:t>
-            </a:r>
-            <a:r>
-              <a:rPr lang="en-US" dirty="0" err="1"/>
-              <a:t>FactoryGirl</a:t>
-            </a:r>
-            <a:r>
-              <a:rPr lang="en-US" dirty="0"/>
-              <a:t>.</a:t>
-            </a:r>
+            <a:endParaRPr lang="en-US" dirty="0"/>
           </a:p>
         </p:txBody>
       </p:sp>
@@ -6412,12 +6401,12 @@
             </a:endParaRPr>
           </a:p>
           <a:p>
-            <a:pPr marL="428625" indent="-173038">
+            <a:pPr marL="712787" lvl="1" indent="-457200">
               <a:lnSpc>
                 <a:spcPct val="94000"/>
               </a:lnSpc>
-              <a:buFont typeface="Wingdings" pitchFamily="82" charset="2"/>
-              <a:buNone/>
+              <a:buFont typeface="Arial" pitchFamily="34" charset="0"/>
+              <a:buChar char="•"/>
               <a:tabLst>
                 <a:tab pos="723900" algn="l"/>
                 <a:tab pos="1447800" algn="l"/>
@@ -6433,17 +6422,39 @@
                 <a:tab pos="8686800" algn="l"/>
               </a:tabLst>
             </a:pPr>
-            <a:endParaRPr lang="en-US" sz="1400" dirty="0">
-              <a:latin typeface="Courier New" pitchFamily="49" charset="0"/>
+            <a:r>
+              <a:rPr lang="en-US" dirty="0" err="1" smtClean="0">
+                <a:latin typeface="Arial" pitchFamily="34" charset="0"/>
+                <a:cs typeface="Arial" pitchFamily="34" charset="0"/>
+              </a:rPr>
+              <a:t>BDD</a:t>
+            </a:r>
+            <a:r>
+              <a:rPr lang="en-US" dirty="0" smtClean="0">
+                <a:latin typeface="Arial" pitchFamily="34" charset="0"/>
+                <a:cs typeface="Arial" pitchFamily="34" charset="0"/>
+              </a:rPr>
+              <a:t> framework for Ruby programming language</a:t>
+            </a:r>
+            <a:r>
+              <a:rPr lang="en-US" dirty="0" smtClean="0">
+                <a:latin typeface="Arial" pitchFamily="34" charset="0"/>
+                <a:cs typeface="Arial" pitchFamily="34" charset="0"/>
+              </a:rPr>
+              <a:t>.</a:t>
+            </a:r>
+            <a:endParaRPr lang="en-US" dirty="0" smtClean="0">
+              <a:latin typeface="Arial" pitchFamily="34" charset="0"/>
+              <a:cs typeface="Arial" pitchFamily="34" charset="0"/>
             </a:endParaRPr>
           </a:p>
           <a:p>
-            <a:pPr marL="428625" indent="-173038">
+            <a:pPr marL="712787" lvl="1" indent="-457200">
               <a:lnSpc>
                 <a:spcPct val="94000"/>
               </a:lnSpc>
-              <a:buFont typeface="Wingdings" pitchFamily="82" charset="2"/>
-              <a:buNone/>
+              <a:buFont typeface="Arial" pitchFamily="34" charset="0"/>
+              <a:buChar char="•"/>
               <a:tabLst>
                 <a:tab pos="723900" algn="l"/>
                 <a:tab pos="1447800" algn="l"/>
@@ -6459,17 +6470,32 @@
                 <a:tab pos="8686800" algn="l"/>
               </a:tabLst>
             </a:pPr>
-            <a:endParaRPr lang="en-US" sz="1400" dirty="0" smtClean="0">
-              <a:latin typeface="Courier New" pitchFamily="49" charset="0"/>
+            <a:r>
+              <a:rPr lang="en-US" dirty="0" smtClean="0">
+                <a:latin typeface="Arial" pitchFamily="34" charset="0"/>
+                <a:cs typeface="Arial" pitchFamily="34" charset="0"/>
+              </a:rPr>
+              <a:t>Has own mocking </a:t>
+            </a:r>
+            <a:r>
+              <a:rPr lang="en-US" dirty="0" smtClean="0">
+                <a:latin typeface="Arial" pitchFamily="34" charset="0"/>
+                <a:cs typeface="Arial" pitchFamily="34" charset="0"/>
+              </a:rPr>
+              <a:t>library</a:t>
+            </a:r>
+            <a:endParaRPr lang="en-US" dirty="0">
+              <a:latin typeface="Arial" pitchFamily="34" charset="0"/>
+              <a:cs typeface="Arial" pitchFamily="34" charset="0"/>
             </a:endParaRPr>
           </a:p>
           <a:p>
-            <a:pPr marL="541337" lvl="1" indent="-285750">
+            <a:pPr marL="712787" lvl="1" indent="-457200">
               <a:lnSpc>
                 <a:spcPct val="94000"/>
               </a:lnSpc>
-              <a:buFont typeface="Wingdings" pitchFamily="2" charset="2"/>
-              <a:buChar char="§"/>
+              <a:buFont typeface="Arial" pitchFamily="34" charset="0"/>
+              <a:buChar char="•"/>
               <a:tabLst>
                 <a:tab pos="723900" algn="l"/>
                 <a:tab pos="1447800" algn="l"/>
@@ -6486,28 +6512,31 @@
               </a:tabLst>
             </a:pPr>
             <a:r>
-              <a:rPr lang="en-US" sz="2400" dirty="0" err="1" smtClean="0">
-                <a:latin typeface="Courier New" pitchFamily="49" charset="0"/>
+              <a:rPr lang="en-US" dirty="0" smtClean="0">
+                <a:latin typeface="Arial" pitchFamily="34" charset="0"/>
+                <a:cs typeface="Arial" pitchFamily="34" charset="0"/>
               </a:rPr>
-              <a:t>BDD</a:t>
-            </a:r>
-            <a:r>
-              <a:rPr lang="en-US" sz="2400" dirty="0" smtClean="0">
-                <a:latin typeface="Courier New" pitchFamily="49" charset="0"/>
+              <a:t>Similar to a natural language specification</a:t>
+            </a:r>
+            <a:r>
+              <a:rPr lang="en-US" dirty="0" smtClean="0">
+                <a:latin typeface="Arial" pitchFamily="34" charset="0"/>
+                <a:cs typeface="Arial" pitchFamily="34" charset="0"/>
               </a:rPr>
-              <a:t> framework for Ruby programming language.</a:t>
-            </a:r>
-            <a:endParaRPr lang="en-US" sz="2400" dirty="0">
-              <a:latin typeface="Courier New" pitchFamily="49" charset="0"/>
+              <a:t>.</a:t>
+            </a:r>
+            <a:endParaRPr lang="en-US" dirty="0">
+              <a:latin typeface="Arial" pitchFamily="34" charset="0"/>
+              <a:cs typeface="Arial" pitchFamily="34" charset="0"/>
             </a:endParaRPr>
           </a:p>
           <a:p>
-            <a:pPr marL="541337" lvl="1" indent="-285750">
+            <a:pPr marL="712787" lvl="1" indent="-457200">
               <a:lnSpc>
                 <a:spcPct val="94000"/>
               </a:lnSpc>
-              <a:buFont typeface="Wingdings" pitchFamily="2" charset="2"/>
-              <a:buChar char="§"/>
+              <a:buFont typeface="Arial" pitchFamily="34" charset="0"/>
+              <a:buChar char="•"/>
               <a:tabLst>
                 <a:tab pos="723900" algn="l"/>
                 <a:tab pos="1447800" algn="l"/>
@@ -6523,162 +6552,30 @@
                 <a:tab pos="8686800" algn="l"/>
               </a:tabLst>
             </a:pPr>
-            <a:endParaRPr lang="en-US" sz="2400" dirty="0" smtClean="0">
-              <a:latin typeface="Courier New" pitchFamily="49" charset="0"/>
-            </a:endParaRPr>
-          </a:p>
-          <a:p>
-            <a:pPr marL="541337" lvl="1" indent="-285750">
-              <a:lnSpc>
-                <a:spcPct val="94000"/>
-              </a:lnSpc>
-              <a:buFont typeface="Wingdings" pitchFamily="2" charset="2"/>
-              <a:buChar char="§"/>
-              <a:tabLst>
-                <a:tab pos="723900" algn="l"/>
-                <a:tab pos="1447800" algn="l"/>
-                <a:tab pos="2171700" algn="l"/>
-                <a:tab pos="2895600" algn="l"/>
-                <a:tab pos="3619500" algn="l"/>
-                <a:tab pos="4343400" algn="l"/>
-                <a:tab pos="5067300" algn="l"/>
-                <a:tab pos="5791200" algn="l"/>
-                <a:tab pos="6515100" algn="l"/>
-                <a:tab pos="7239000" algn="l"/>
-                <a:tab pos="7962900" algn="l"/>
-                <a:tab pos="8686800" algn="l"/>
-              </a:tabLst>
-            </a:pPr>
-            <a:r>
-              <a:rPr lang="en-US" sz="2400" dirty="0" smtClean="0">
-                <a:latin typeface="Courier New" pitchFamily="49" charset="0"/>
-              </a:rPr>
-              <a:t>Has own mocking library</a:t>
-            </a:r>
-          </a:p>
-          <a:p>
-            <a:pPr marL="541337" lvl="1" indent="-285750">
-              <a:lnSpc>
-                <a:spcPct val="94000"/>
-              </a:lnSpc>
-              <a:buFont typeface="Wingdings" pitchFamily="2" charset="2"/>
-              <a:buChar char="§"/>
-              <a:tabLst>
-                <a:tab pos="723900" algn="l"/>
-                <a:tab pos="1447800" algn="l"/>
-                <a:tab pos="2171700" algn="l"/>
-                <a:tab pos="2895600" algn="l"/>
-                <a:tab pos="3619500" algn="l"/>
-                <a:tab pos="4343400" algn="l"/>
-                <a:tab pos="5067300" algn="l"/>
-                <a:tab pos="5791200" algn="l"/>
-                <a:tab pos="6515100" algn="l"/>
-                <a:tab pos="7239000" algn="l"/>
-                <a:tab pos="7962900" algn="l"/>
-                <a:tab pos="8686800" algn="l"/>
-              </a:tabLst>
-            </a:pPr>
-            <a:endParaRPr lang="en-US" sz="2400" dirty="0">
-              <a:latin typeface="Courier New" pitchFamily="49" charset="0"/>
-            </a:endParaRPr>
-          </a:p>
-          <a:p>
-            <a:pPr marL="541337" lvl="1" indent="-285750">
-              <a:lnSpc>
-                <a:spcPct val="94000"/>
-              </a:lnSpc>
-              <a:buFont typeface="Wingdings" pitchFamily="2" charset="2"/>
-              <a:buChar char="§"/>
-              <a:tabLst>
-                <a:tab pos="723900" algn="l"/>
-                <a:tab pos="1447800" algn="l"/>
-                <a:tab pos="2171700" algn="l"/>
-                <a:tab pos="2895600" algn="l"/>
-                <a:tab pos="3619500" algn="l"/>
-                <a:tab pos="4343400" algn="l"/>
-                <a:tab pos="5067300" algn="l"/>
-                <a:tab pos="5791200" algn="l"/>
-                <a:tab pos="6515100" algn="l"/>
-                <a:tab pos="7239000" algn="l"/>
-                <a:tab pos="7962900" algn="l"/>
-                <a:tab pos="8686800" algn="l"/>
-              </a:tabLst>
-            </a:pPr>
-            <a:r>
-              <a:rPr lang="en-US" sz="2400" dirty="0" smtClean="0">
-                <a:latin typeface="Courier New" pitchFamily="49" charset="0"/>
-              </a:rPr>
-              <a:t>Similar to a natural language specification.</a:t>
-            </a:r>
-          </a:p>
-          <a:p>
-            <a:pPr marL="541337" lvl="1" indent="-285750">
-              <a:lnSpc>
-                <a:spcPct val="94000"/>
-              </a:lnSpc>
-              <a:buFont typeface="Wingdings" pitchFamily="2" charset="2"/>
-              <a:buChar char="§"/>
-              <a:tabLst>
-                <a:tab pos="723900" algn="l"/>
-                <a:tab pos="1447800" algn="l"/>
-                <a:tab pos="2171700" algn="l"/>
-                <a:tab pos="2895600" algn="l"/>
-                <a:tab pos="3619500" algn="l"/>
-                <a:tab pos="4343400" algn="l"/>
-                <a:tab pos="5067300" algn="l"/>
-                <a:tab pos="5791200" algn="l"/>
-                <a:tab pos="6515100" algn="l"/>
-                <a:tab pos="7239000" algn="l"/>
-                <a:tab pos="7962900" algn="l"/>
-                <a:tab pos="8686800" algn="l"/>
-              </a:tabLst>
-            </a:pPr>
-            <a:endParaRPr lang="en-US" sz="2400" dirty="0">
-              <a:latin typeface="Courier New" pitchFamily="49" charset="0"/>
-            </a:endParaRPr>
-          </a:p>
-          <a:p>
-            <a:pPr marL="541337" lvl="1" indent="-285750">
-              <a:lnSpc>
-                <a:spcPct val="94000"/>
-              </a:lnSpc>
-              <a:buFont typeface="Wingdings" pitchFamily="2" charset="2"/>
-              <a:buChar char="§"/>
-              <a:tabLst>
-                <a:tab pos="723900" algn="l"/>
-                <a:tab pos="1447800" algn="l"/>
-                <a:tab pos="2171700" algn="l"/>
-                <a:tab pos="2895600" algn="l"/>
-                <a:tab pos="3619500" algn="l"/>
-                <a:tab pos="4343400" algn="l"/>
-                <a:tab pos="5067300" algn="l"/>
-                <a:tab pos="5791200" algn="l"/>
-                <a:tab pos="6515100" algn="l"/>
-                <a:tab pos="7239000" algn="l"/>
-                <a:tab pos="7962900" algn="l"/>
-                <a:tab pos="8686800" algn="l"/>
-              </a:tabLst>
-            </a:pPr>
-            <a:r>
-              <a:rPr lang="en-US" sz="2400" dirty="0" err="1" smtClean="0">
-                <a:latin typeface="Courier New" pitchFamily="49" charset="0"/>
+            <a:r>
+              <a:rPr lang="en-US" dirty="0" err="1" smtClean="0">
+                <a:latin typeface="Arial" pitchFamily="34" charset="0"/>
+                <a:cs typeface="Arial" pitchFamily="34" charset="0"/>
               </a:rPr>
               <a:t>RSpec</a:t>
             </a:r>
             <a:r>
-              <a:rPr lang="en-US" sz="2400" dirty="0" smtClean="0">
-                <a:latin typeface="Courier New" pitchFamily="49" charset="0"/>
+              <a:rPr lang="en-US" dirty="0" smtClean="0">
+                <a:latin typeface="Arial" pitchFamily="34" charset="0"/>
+                <a:cs typeface="Arial" pitchFamily="34" charset="0"/>
               </a:rPr>
               <a:t> is </a:t>
             </a:r>
             <a:r>
-              <a:rPr lang="en-US" sz="2400" dirty="0" err="1" smtClean="0">
-                <a:latin typeface="Courier New" pitchFamily="49" charset="0"/>
+              <a:rPr lang="en-US" dirty="0" err="1" smtClean="0">
+                <a:latin typeface="Arial" pitchFamily="34" charset="0"/>
+                <a:cs typeface="Arial" pitchFamily="34" charset="0"/>
               </a:rPr>
               <a:t>BDD</a:t>
             </a:r>
-            <a:endParaRPr lang="en-US" sz="2400" dirty="0">
-              <a:latin typeface="Courier New" pitchFamily="49" charset="0"/>
+            <a:endParaRPr lang="en-US" dirty="0">
+              <a:latin typeface="Arial" pitchFamily="34" charset="0"/>
+              <a:cs typeface="Arial" pitchFamily="34" charset="0"/>
             </a:endParaRPr>
           </a:p>
         </p:txBody>
@@ -7683,11 +7580,7 @@
             </a:pPr>
             <a:r>
               <a:rPr lang="en-US" dirty="0"/>
-              <a:t>By default the above will run all </a:t>
-            </a:r>
-            <a:r>
-              <a:rPr lang="en-US" dirty="0"/>
-              <a:t>_</a:t>
+              <a:t>By default the above will run all _</a:t>
             </a:r>
             <a:r>
               <a:rPr lang="en-US" dirty="0" err="1"/>
@@ -7695,15 +7588,7 @@
             </a:r>
             <a:r>
               <a:rPr lang="en-US" dirty="0"/>
-              <a:t> files in the </a:t>
-            </a:r>
-            <a:r>
-              <a:rPr lang="en-US" dirty="0"/>
-              <a:t>spec</a:t>
-            </a:r>
-            <a:r>
-              <a:rPr lang="en-US" dirty="0"/>
-              <a:t> directory</a:t>
+              <a:t> files in the spec directory</a:t>
             </a:r>
             <a:r>
               <a:rPr lang="en-US" dirty="0" smtClean="0"/>
@@ -8433,6 +8318,10 @@
               <a:rPr lang="en-US" dirty="0" err="1" smtClean="0"/>
               <a:t>TDD</a:t>
             </a:r>
+            <a:r>
+              <a:rPr lang="en-US" dirty="0" smtClean="0"/>
+              <a:t> (Test Driven Development)</a:t>
+            </a:r>
             <a:endParaRPr lang="en-US" dirty="0"/>
           </a:p>
         </p:txBody>
@@ -8714,7 +8603,11 @@
             </a:pPr>
             <a:r>
               <a:rPr lang="en-US" sz="2400" dirty="0" smtClean="0"/>
-              <a:t>It ‘tests’ that drive the ‘development’</a:t>
+              <a:t>Its </a:t>
+            </a:r>
+            <a:r>
+              <a:rPr lang="en-US" sz="2400" dirty="0" smtClean="0"/>
+              <a:t>‘tests’ that drive the ‘development’</a:t>
             </a:r>
           </a:p>
           <a:p>
@@ -8818,6 +8711,10 @@
               <a:rPr lang="en-US" dirty="0" smtClean="0"/>
               <a:t> </a:t>
             </a:r>
+            <a:r>
+              <a:rPr lang="en-US" dirty="0" smtClean="0"/>
+              <a:t>(Behavior Driven Development)</a:t>
+            </a:r>
             <a:endParaRPr lang="en-US" dirty="0"/>
           </a:p>
         </p:txBody>
@@ -8838,12 +8735,12 @@
           <a:lstStyle/>
           <a:p>
             <a:r>
-              <a:rPr lang="en-US" dirty="0" err="1" smtClean="0"/>
-              <a:t>BDD</a:t>
-            </a:r>
-            <a:r>
               <a:rPr lang="en-US" dirty="0" smtClean="0"/>
-              <a:t> is based on </a:t>
+              <a:t>is </a:t>
+            </a:r>
+            <a:r>
+              <a:rPr lang="en-US" dirty="0" smtClean="0"/>
+              <a:t>based on </a:t>
             </a:r>
             <a:r>
               <a:rPr lang="en-US" dirty="0" err="1" smtClean="0"/>
@@ -8853,30 +8750,30 @@
           </a:p>
           <a:p>
             <a:r>
-              <a:rPr lang="en-US" dirty="0" err="1" smtClean="0"/>
-              <a:t>BDD</a:t>
-            </a:r>
-            <a:r>
               <a:rPr lang="en-US" dirty="0" smtClean="0"/>
-              <a:t> is specifying how your application should work, rather than verifying it works</a:t>
-            </a:r>
-          </a:p>
-          <a:p>
-            <a:r>
-              <a:rPr lang="en-US" dirty="0" err="1" smtClean="0"/>
-              <a:t>Behaviour</a:t>
+              <a:t>is </a:t>
             </a:r>
             <a:r>
               <a:rPr lang="en-US" dirty="0" smtClean="0"/>
-              <a:t>-driven development is about implementing an application by describing its </a:t>
-            </a:r>
-            <a:r>
-              <a:rPr lang="en-US" dirty="0" err="1" smtClean="0"/>
-              <a:t>behaviour</a:t>
-            </a:r>
+              <a:t>specifying how your application should work, rather than verifying it works</a:t>
+            </a:r>
+          </a:p>
+          <a:p>
             <a:r>
               <a:rPr lang="en-US" dirty="0" smtClean="0"/>
-              <a:t> from the perspective of its stakeholders.</a:t>
+              <a:t>is </a:t>
+            </a:r>
+            <a:r>
+              <a:rPr lang="en-US" dirty="0" smtClean="0"/>
+              <a:t>about implementing an application by describing its </a:t>
+            </a:r>
+            <a:r>
+              <a:rPr lang="en-US" dirty="0" smtClean="0"/>
+              <a:t>behavior </a:t>
+            </a:r>
+            <a:r>
+              <a:rPr lang="en-US" dirty="0" smtClean="0"/>
+              <a:t>from the perspective of its stakeholders.</a:t>
             </a:r>
             <a:endParaRPr lang="en-US" dirty="0"/>
           </a:p>
@@ -9231,10 +9128,6 @@
             <a:endParaRPr lang="en-US" dirty="0"/>
           </a:p>
           <a:p>
-            <a:pPr>
-              <a:buFont typeface="Wingdings" pitchFamily="82" charset="2"/>
-              <a:buChar char="§"/>
-            </a:pPr>
             <a:r>
               <a:rPr lang="en-US" dirty="0" err="1"/>
               <a:t>BDD</a:t>
@@ -9245,17 +9138,10 @@
             </a:r>
           </a:p>
           <a:p>
-            <a:pPr>
-              <a:buFont typeface="Wingdings" pitchFamily="82" charset="2"/>
-              <a:buChar char="§"/>
-            </a:pPr>
             <a:r>
               <a:rPr lang="en-US" dirty="0"/>
               <a:t>Blueprint that is also executable and verifiable. </a:t>
             </a:r>
-          </a:p>
-          <a:p>
-            <a:endParaRPr lang="en-US" dirty="0"/>
           </a:p>
         </p:txBody>
       </p:sp>

</xml_diff>